<commit_message>
make it better at home
</commit_message>
<xml_diff>
--- a/code_patois/Presentation1.pptx
+++ b/code_patois/Presentation1.pptx
@@ -15,6 +15,7 @@
     <p:sldId id="263" r:id="rId9"/>
     <p:sldId id="264" r:id="rId10"/>
     <p:sldId id="265" r:id="rId11"/>
+    <p:sldId id="266" r:id="rId12"/>
   </p:sldIdLst>
   <p:sldSz cx="12192000" cy="6858000"/>
   <p:notesSz cx="6858000" cy="9144000"/>
@@ -252,7 +253,7 @@
           <a:p>
             <a:fld id="{BFE556AC-2E0F-4025-80B1-D9AB22AA4F29}" type="datetimeFigureOut">
               <a:rPr lang="it-IT" smtClean="0"/>
-              <a:t>08/06/2015</a:t>
+              <a:t>16/06/2015</a:t>
             </a:fld>
             <a:endParaRPr lang="it-IT"/>
           </a:p>
@@ -422,7 +423,7 @@
           <a:p>
             <a:fld id="{BFE556AC-2E0F-4025-80B1-D9AB22AA4F29}" type="datetimeFigureOut">
               <a:rPr lang="it-IT" smtClean="0"/>
-              <a:t>08/06/2015</a:t>
+              <a:t>16/06/2015</a:t>
             </a:fld>
             <a:endParaRPr lang="it-IT"/>
           </a:p>
@@ -602,7 +603,7 @@
           <a:p>
             <a:fld id="{BFE556AC-2E0F-4025-80B1-D9AB22AA4F29}" type="datetimeFigureOut">
               <a:rPr lang="it-IT" smtClean="0"/>
-              <a:t>08/06/2015</a:t>
+              <a:t>16/06/2015</a:t>
             </a:fld>
             <a:endParaRPr lang="it-IT"/>
           </a:p>
@@ -772,7 +773,7 @@
           <a:p>
             <a:fld id="{BFE556AC-2E0F-4025-80B1-D9AB22AA4F29}" type="datetimeFigureOut">
               <a:rPr lang="it-IT" smtClean="0"/>
-              <a:t>08/06/2015</a:t>
+              <a:t>16/06/2015</a:t>
             </a:fld>
             <a:endParaRPr lang="it-IT"/>
           </a:p>
@@ -1018,7 +1019,7 @@
           <a:p>
             <a:fld id="{BFE556AC-2E0F-4025-80B1-D9AB22AA4F29}" type="datetimeFigureOut">
               <a:rPr lang="it-IT" smtClean="0"/>
-              <a:t>08/06/2015</a:t>
+              <a:t>16/06/2015</a:t>
             </a:fld>
             <a:endParaRPr lang="it-IT"/>
           </a:p>
@@ -1250,7 +1251,7 @@
           <a:p>
             <a:fld id="{BFE556AC-2E0F-4025-80B1-D9AB22AA4F29}" type="datetimeFigureOut">
               <a:rPr lang="it-IT" smtClean="0"/>
-              <a:t>08/06/2015</a:t>
+              <a:t>16/06/2015</a:t>
             </a:fld>
             <a:endParaRPr lang="it-IT"/>
           </a:p>
@@ -1617,7 +1618,7 @@
           <a:p>
             <a:fld id="{BFE556AC-2E0F-4025-80B1-D9AB22AA4F29}" type="datetimeFigureOut">
               <a:rPr lang="it-IT" smtClean="0"/>
-              <a:t>08/06/2015</a:t>
+              <a:t>16/06/2015</a:t>
             </a:fld>
             <a:endParaRPr lang="it-IT"/>
           </a:p>
@@ -1735,7 +1736,7 @@
           <a:p>
             <a:fld id="{BFE556AC-2E0F-4025-80B1-D9AB22AA4F29}" type="datetimeFigureOut">
               <a:rPr lang="it-IT" smtClean="0"/>
-              <a:t>08/06/2015</a:t>
+              <a:t>16/06/2015</a:t>
             </a:fld>
             <a:endParaRPr lang="it-IT"/>
           </a:p>
@@ -1830,7 +1831,7 @@
           <a:p>
             <a:fld id="{BFE556AC-2E0F-4025-80B1-D9AB22AA4F29}" type="datetimeFigureOut">
               <a:rPr lang="it-IT" smtClean="0"/>
-              <a:t>08/06/2015</a:t>
+              <a:t>16/06/2015</a:t>
             </a:fld>
             <a:endParaRPr lang="it-IT"/>
           </a:p>
@@ -2107,7 +2108,7 @@
           <a:p>
             <a:fld id="{BFE556AC-2E0F-4025-80B1-D9AB22AA4F29}" type="datetimeFigureOut">
               <a:rPr lang="it-IT" smtClean="0"/>
-              <a:t>08/06/2015</a:t>
+              <a:t>16/06/2015</a:t>
             </a:fld>
             <a:endParaRPr lang="it-IT"/>
           </a:p>
@@ -2360,7 +2361,7 @@
           <a:p>
             <a:fld id="{BFE556AC-2E0F-4025-80B1-D9AB22AA4F29}" type="datetimeFigureOut">
               <a:rPr lang="it-IT" smtClean="0"/>
-              <a:t>08/06/2015</a:t>
+              <a:t>16/06/2015</a:t>
             </a:fld>
             <a:endParaRPr lang="it-IT"/>
           </a:p>
@@ -2573,7 +2574,7 @@
           <a:p>
             <a:fld id="{BFE556AC-2E0F-4025-80B1-D9AB22AA4F29}" type="datetimeFigureOut">
               <a:rPr lang="it-IT" smtClean="0"/>
-              <a:t>08/06/2015</a:t>
+              <a:t>16/06/2015</a:t>
             </a:fld>
             <a:endParaRPr lang="it-IT"/>
           </a:p>
@@ -3790,6 +3791,155 @@
 </p:sld>
 </file>
 
+<file path=ppt/slides/slide11.xml><?xml version="1.0" encoding="utf-8"?>
+<p:sld xmlns:a="http://schemas.openxmlformats.org/drawingml/2006/main" xmlns:r="http://schemas.openxmlformats.org/officeDocument/2006/relationships" xmlns:p="http://schemas.openxmlformats.org/presentationml/2006/main">
+  <p:cSld>
+    <p:spTree>
+      <p:nvGrpSpPr>
+        <p:cNvPr id="1" name=""/>
+        <p:cNvGrpSpPr/>
+        <p:nvPr/>
+      </p:nvGrpSpPr>
+      <p:grpSpPr>
+        <a:xfrm>
+          <a:off x="0" y="0"/>
+          <a:ext cx="0" cy="0"/>
+          <a:chOff x="0" y="0"/>
+          <a:chExt cx="0" cy="0"/>
+        </a:xfrm>
+      </p:grpSpPr>
+      <p:sp>
+        <p:nvSpPr>
+          <p:cNvPr id="4" name="Rectangle 3"/>
+          <p:cNvSpPr/>
+          <p:nvPr/>
+        </p:nvSpPr>
+        <p:spPr>
+          <a:xfrm>
+            <a:off x="7143750" y="1376613"/>
+            <a:ext cx="3676649" cy="2815390"/>
+          </a:xfrm>
+          <a:prstGeom prst="rect">
+            <a:avLst/>
+          </a:prstGeom>
+          <a:ln/>
+          <a:effectLst>
+            <a:glow rad="127000">
+              <a:schemeClr val="bg1">
+                <a:lumMod val="50000"/>
+              </a:schemeClr>
+            </a:glow>
+          </a:effectLst>
+        </p:spPr>
+        <p:style>
+          <a:lnRef idx="2">
+            <a:schemeClr val="accent3"/>
+          </a:lnRef>
+          <a:fillRef idx="1">
+            <a:schemeClr val="lt1"/>
+          </a:fillRef>
+          <a:effectRef idx="0">
+            <a:schemeClr val="accent3"/>
+          </a:effectRef>
+          <a:fontRef idx="minor">
+            <a:schemeClr val="dk1"/>
+          </a:fontRef>
+        </p:style>
+        <p:txBody>
+          <a:bodyPr rtlCol="0" anchor="ctr">
+            <a:scene3d>
+              <a:camera prst="perspectiveRelaxedModerately"/>
+              <a:lightRig rig="threePt" dir="t"/>
+            </a:scene3d>
+            <a:sp3d extrusionH="57150">
+              <a:bevelT w="69850" h="69850" prst="divot"/>
+            </a:sp3d>
+          </a:bodyPr>
+          <a:lstStyle/>
+          <a:p>
+            <a:pPr algn="ctr"/>
+            <a:r>
+              <a:rPr lang="en-GB" sz="15000" b="1" dirty="0" smtClean="0">
+                <a:solidFill>
+                  <a:srgbClr val="C44A36"/>
+                </a:solidFill>
+                <a:effectLst>
+                  <a:glow rad="139700">
+                    <a:schemeClr val="accent2">
+                      <a:satMod val="175000"/>
+                      <a:alpha val="40000"/>
+                    </a:schemeClr>
+                  </a:glow>
+                  <a:outerShdw blurRad="60007" dist="310007" dir="7680000" sy="30000" kx="1300200" algn="ctr" rotWithShape="0">
+                    <a:prstClr val="black">
+                      <a:alpha val="32000"/>
+                    </a:prstClr>
+                  </a:outerShdw>
+                </a:effectLst>
+                <a:latin typeface="Segoe Print" panose="02000600000000000000" pitchFamily="2" charset="0"/>
+              </a:rPr>
+              <a:t>M</a:t>
+            </a:r>
+            <a:r>
+              <a:rPr lang="en-GB" sz="15000" b="1" dirty="0" smtClean="0">
+                <a:solidFill>
+                  <a:srgbClr val="C44A36"/>
+                </a:solidFill>
+                <a:effectLst>
+                  <a:glow rad="101600">
+                    <a:schemeClr val="accent2">
+                      <a:satMod val="175000"/>
+                      <a:alpha val="40000"/>
+                    </a:schemeClr>
+                  </a:glow>
+                  <a:outerShdw blurRad="60007" dist="310007" dir="7680000" sy="30000" kx="1300200" algn="ctr" rotWithShape="0">
+                    <a:prstClr val="black">
+                      <a:alpha val="32000"/>
+                    </a:prstClr>
+                  </a:outerShdw>
+                </a:effectLst>
+                <a:latin typeface="Segoe Print" panose="02000600000000000000" pitchFamily="2" charset="0"/>
+              </a:rPr>
+              <a:t>P</a:t>
+            </a:r>
+            <a:endParaRPr lang="it-IT" sz="15000" b="1" dirty="0">
+              <a:solidFill>
+                <a:schemeClr val="tx1">
+                  <a:lumMod val="50000"/>
+                  <a:lumOff val="50000"/>
+                </a:schemeClr>
+              </a:solidFill>
+              <a:effectLst>
+                <a:glow rad="228600">
+                  <a:schemeClr val="accent3">
+                    <a:satMod val="175000"/>
+                    <a:alpha val="40000"/>
+                  </a:schemeClr>
+                </a:glow>
+                <a:outerShdw blurRad="60007" dist="310007" dir="7680000" sy="30000" kx="1300200" algn="ctr" rotWithShape="0">
+                  <a:prstClr val="black">
+                    <a:alpha val="32000"/>
+                  </a:prstClr>
+                </a:outerShdw>
+              </a:effectLst>
+              <a:latin typeface="Segoe Print" panose="02000600000000000000" pitchFamily="2" charset="0"/>
+            </a:endParaRPr>
+          </a:p>
+        </p:txBody>
+      </p:sp>
+    </p:spTree>
+    <p:extLst>
+      <p:ext uri="{BB962C8B-B14F-4D97-AF65-F5344CB8AC3E}">
+        <p14:creationId xmlns:p14="http://schemas.microsoft.com/office/powerpoint/2010/main" val="3647788438"/>
+      </p:ext>
+    </p:extLst>
+  </p:cSld>
+  <p:clrMapOvr>
+    <a:masterClrMapping/>
+  </p:clrMapOvr>
+</p:sld>
+</file>
+
 <file path=ppt/slides/slide2.xml><?xml version="1.0" encoding="utf-8"?>
 <p:sld xmlns:a="http://schemas.openxmlformats.org/drawingml/2006/main" xmlns:r="http://schemas.openxmlformats.org/officeDocument/2006/relationships" xmlns:p="http://schemas.openxmlformats.org/presentationml/2006/main">
   <p:cSld>

</xml_diff>